<commit_message>
Add replicated Postgres DB
</commit_message>
<xml_diff>
--- a/assets/logo.pptx
+++ b/assets/logo.pptx
@@ -104,6 +104,11 @@
       </a:defRPr>
     </a:lvl9pPr>
   </p:defaultTextStyle>
+  <p:extLst>
+    <p:ext uri="{EFAFB233-063F-42B5-8137-9DF3F51BA10A}">
+      <p15:sldGuideLst xmlns:p15="http://schemas.microsoft.com/office/powerpoint/2012/main"/>
+    </p:ext>
+  </p:extLst>
 </p:presentation>
 </file>
 
@@ -256,7 +261,7 @@
           <a:p>
             <a:fld id="{8BCA932E-6ACD-4E75-8718-090241954366}" type="datetimeFigureOut">
               <a:rPr lang="en-GB" smtClean="0"/>
-              <a:t>19/01/2021</a:t>
+              <a:t>05/03/2021</a:t>
             </a:fld>
             <a:endParaRPr lang="en-GB"/>
           </a:p>
@@ -456,7 +461,7 @@
           <a:p>
             <a:fld id="{8BCA932E-6ACD-4E75-8718-090241954366}" type="datetimeFigureOut">
               <a:rPr lang="en-GB" smtClean="0"/>
-              <a:t>19/01/2021</a:t>
+              <a:t>05/03/2021</a:t>
             </a:fld>
             <a:endParaRPr lang="en-GB"/>
           </a:p>
@@ -666,7 +671,7 @@
           <a:p>
             <a:fld id="{8BCA932E-6ACD-4E75-8718-090241954366}" type="datetimeFigureOut">
               <a:rPr lang="en-GB" smtClean="0"/>
-              <a:t>19/01/2021</a:t>
+              <a:t>05/03/2021</a:t>
             </a:fld>
             <a:endParaRPr lang="en-GB"/>
           </a:p>
@@ -866,7 +871,7 @@
           <a:p>
             <a:fld id="{8BCA932E-6ACD-4E75-8718-090241954366}" type="datetimeFigureOut">
               <a:rPr lang="en-GB" smtClean="0"/>
-              <a:t>19/01/2021</a:t>
+              <a:t>05/03/2021</a:t>
             </a:fld>
             <a:endParaRPr lang="en-GB"/>
           </a:p>
@@ -1142,7 +1147,7 @@
           <a:p>
             <a:fld id="{8BCA932E-6ACD-4E75-8718-090241954366}" type="datetimeFigureOut">
               <a:rPr lang="en-GB" smtClean="0"/>
-              <a:t>19/01/2021</a:t>
+              <a:t>05/03/2021</a:t>
             </a:fld>
             <a:endParaRPr lang="en-GB"/>
           </a:p>
@@ -1410,7 +1415,7 @@
           <a:p>
             <a:fld id="{8BCA932E-6ACD-4E75-8718-090241954366}" type="datetimeFigureOut">
               <a:rPr lang="en-GB" smtClean="0"/>
-              <a:t>19/01/2021</a:t>
+              <a:t>05/03/2021</a:t>
             </a:fld>
             <a:endParaRPr lang="en-GB"/>
           </a:p>
@@ -1825,7 +1830,7 @@
           <a:p>
             <a:fld id="{8BCA932E-6ACD-4E75-8718-090241954366}" type="datetimeFigureOut">
               <a:rPr lang="en-GB" smtClean="0"/>
-              <a:t>19/01/2021</a:t>
+              <a:t>05/03/2021</a:t>
             </a:fld>
             <a:endParaRPr lang="en-GB"/>
           </a:p>
@@ -1967,7 +1972,7 @@
           <a:p>
             <a:fld id="{8BCA932E-6ACD-4E75-8718-090241954366}" type="datetimeFigureOut">
               <a:rPr lang="en-GB" smtClean="0"/>
-              <a:t>19/01/2021</a:t>
+              <a:t>05/03/2021</a:t>
             </a:fld>
             <a:endParaRPr lang="en-GB"/>
           </a:p>
@@ -2080,7 +2085,7 @@
           <a:p>
             <a:fld id="{8BCA932E-6ACD-4E75-8718-090241954366}" type="datetimeFigureOut">
               <a:rPr lang="en-GB" smtClean="0"/>
-              <a:t>19/01/2021</a:t>
+              <a:t>05/03/2021</a:t>
             </a:fld>
             <a:endParaRPr lang="en-GB"/>
           </a:p>
@@ -2393,7 +2398,7 @@
           <a:p>
             <a:fld id="{8BCA932E-6ACD-4E75-8718-090241954366}" type="datetimeFigureOut">
               <a:rPr lang="en-GB" smtClean="0"/>
-              <a:t>19/01/2021</a:t>
+              <a:t>05/03/2021</a:t>
             </a:fld>
             <a:endParaRPr lang="en-GB"/>
           </a:p>
@@ -2682,7 +2687,7 @@
           <a:p>
             <a:fld id="{8BCA932E-6ACD-4E75-8718-090241954366}" type="datetimeFigureOut">
               <a:rPr lang="en-GB" smtClean="0"/>
-              <a:t>19/01/2021</a:t>
+              <a:t>05/03/2021</a:t>
             </a:fld>
             <a:endParaRPr lang="en-GB"/>
           </a:p>
@@ -2925,7 +2930,7 @@
           <a:p>
             <a:fld id="{8BCA932E-6ACD-4E75-8718-090241954366}" type="datetimeFigureOut">
               <a:rPr lang="en-GB" smtClean="0"/>
-              <a:t>19/01/2021</a:t>
+              <a:t>05/03/2021</a:t>
             </a:fld>
             <a:endParaRPr lang="en-GB"/>
           </a:p>
@@ -3342,155 +3347,12 @@
           <a:chExt cx="0" cy="0"/>
         </a:xfrm>
       </p:grpSpPr>
-      <p:sp>
-        <p:nvSpPr>
-          <p:cNvPr id="14" name="Oval 13">
-            <a:extLst>
-              <a:ext uri="{FF2B5EF4-FFF2-40B4-BE49-F238E27FC236}">
-                <a16:creationId xmlns:a16="http://schemas.microsoft.com/office/drawing/2014/main" id="{3A15BD70-6D30-4AA3-85EC-5791A580E25C}"/>
-              </a:ext>
-            </a:extLst>
-          </p:cNvPr>
-          <p:cNvSpPr/>
-          <p:nvPr/>
-        </p:nvSpPr>
-        <p:spPr>
-          <a:xfrm>
-            <a:off x="3128047" y="111315"/>
-            <a:ext cx="4612813" cy="4612813"/>
-          </a:xfrm>
-          <a:prstGeom prst="ellipse">
-            <a:avLst/>
-          </a:prstGeom>
-          <a:solidFill>
-            <a:schemeClr val="bg2"/>
-          </a:solidFill>
-          <a:ln>
-            <a:noFill/>
-          </a:ln>
-        </p:spPr>
-        <p:style>
-          <a:lnRef idx="2">
-            <a:schemeClr val="accent1">
-              <a:shade val="50000"/>
-            </a:schemeClr>
-          </a:lnRef>
-          <a:fillRef idx="1">
-            <a:schemeClr val="accent1"/>
-          </a:fillRef>
-          <a:effectRef idx="0">
-            <a:schemeClr val="accent1"/>
-          </a:effectRef>
-          <a:fontRef idx="minor">
-            <a:schemeClr val="lt1"/>
-          </a:fontRef>
-        </p:style>
-        <p:txBody>
-          <a:bodyPr rtlCol="0" anchor="ctr"/>
-          <a:lstStyle/>
-          <a:p>
-            <a:pPr algn="ctr"/>
-            <a:endParaRPr lang="en-GB"/>
-          </a:p>
-        </p:txBody>
-      </p:sp>
-      <p:sp>
-        <p:nvSpPr>
-          <p:cNvPr id="15" name="Rectangle 14">
-            <a:extLst>
-              <a:ext uri="{FF2B5EF4-FFF2-40B4-BE49-F238E27FC236}">
-                <a16:creationId xmlns:a16="http://schemas.microsoft.com/office/drawing/2014/main" id="{7B8F2075-12F4-4780-A862-8F04FAF55711}"/>
-              </a:ext>
-            </a:extLst>
-          </p:cNvPr>
-          <p:cNvSpPr/>
-          <p:nvPr/>
-        </p:nvSpPr>
-        <p:spPr>
-          <a:xfrm>
-            <a:off x="2870421" y="2195839"/>
-            <a:ext cx="5120640" cy="2635504"/>
-          </a:xfrm>
-          <a:prstGeom prst="rect">
-            <a:avLst/>
-          </a:prstGeom>
-          <a:solidFill>
-            <a:schemeClr val="bg1"/>
-          </a:solidFill>
-          <a:ln>
-            <a:noFill/>
-          </a:ln>
-        </p:spPr>
-        <p:style>
-          <a:lnRef idx="2">
-            <a:schemeClr val="accent1">
-              <a:shade val="50000"/>
-            </a:schemeClr>
-          </a:lnRef>
-          <a:fillRef idx="1">
-            <a:schemeClr val="accent1"/>
-          </a:fillRef>
-          <a:effectRef idx="0">
-            <a:schemeClr val="accent1"/>
-          </a:effectRef>
-          <a:fontRef idx="minor">
-            <a:schemeClr val="lt1"/>
-          </a:fontRef>
-        </p:style>
-        <p:txBody>
-          <a:bodyPr rtlCol="0" anchor="ctr"/>
-          <a:lstStyle/>
-          <a:p>
-            <a:pPr algn="ctr"/>
-            <a:endParaRPr lang="en-GB"/>
-          </a:p>
-        </p:txBody>
-      </p:sp>
-      <p:pic>
-        <p:nvPicPr>
-          <p:cNvPr id="6" name="Graphic 5">
-            <a:extLst>
-              <a:ext uri="{FF2B5EF4-FFF2-40B4-BE49-F238E27FC236}">
-                <a16:creationId xmlns:a16="http://schemas.microsoft.com/office/drawing/2014/main" id="{55D0BCDE-41B6-4D1B-97AE-924297BA11A3}"/>
-              </a:ext>
-            </a:extLst>
-          </p:cNvPr>
-          <p:cNvPicPr>
-            <a:picLocks noChangeAspect="1"/>
-          </p:cNvPicPr>
-          <p:nvPr/>
-        </p:nvPicPr>
-        <p:blipFill>
-          <a:blip r:embed="rId2">
-            <a:extLst>
-              <a:ext uri="{28A0092B-C50C-407E-A947-70E740481C1C}">
-                <a14:useLocalDpi xmlns:a14="http://schemas.microsoft.com/office/drawing/2010/main" val="0"/>
-              </a:ext>
-              <a:ext uri="{96DAC541-7B7A-43D3-8B79-37D633B846F1}">
-                <asvg:svgBlip xmlns:asvg="http://schemas.microsoft.com/office/drawing/2016/SVG/main" r:embed="rId3"/>
-              </a:ext>
-            </a:extLst>
-          </a:blip>
-          <a:stretch>
-            <a:fillRect/>
-          </a:stretch>
-        </p:blipFill>
-        <p:spPr>
-          <a:xfrm>
-            <a:off x="3840300" y="1037972"/>
-            <a:ext cx="930125" cy="930125"/>
-          </a:xfrm>
-          <a:prstGeom prst="rect">
-            <a:avLst/>
-          </a:prstGeom>
-        </p:spPr>
-      </p:pic>
       <p:grpSp>
         <p:nvGrpSpPr>
-          <p:cNvPr id="13" name="Group 12">
-            <a:extLst>
-              <a:ext uri="{FF2B5EF4-FFF2-40B4-BE49-F238E27FC236}">
-                <a16:creationId xmlns:a16="http://schemas.microsoft.com/office/drawing/2014/main" id="{A7251B03-2135-4A72-A548-64AE646195D2}"/>
+          <p:cNvPr id="16" name="Group 15">
+            <a:extLst>
+              <a:ext uri="{FF2B5EF4-FFF2-40B4-BE49-F238E27FC236}">
+                <a16:creationId xmlns:a16="http://schemas.microsoft.com/office/drawing/2014/main" id="{3B723AB8-C83A-4089-99FD-36ADF600716D}"/>
               </a:ext>
             </a:extLst>
           </p:cNvPr>
@@ -3499,60 +3361,207 @@
         </p:nvGrpSpPr>
         <p:grpSpPr>
           <a:xfrm>
-            <a:off x="3037398" y="2190269"/>
-            <a:ext cx="4751170" cy="923330"/>
-            <a:chOff x="2775005" y="2394754"/>
-            <a:chExt cx="4751170" cy="923330"/>
+            <a:off x="3180947" y="1198355"/>
+            <a:ext cx="5120640" cy="3108577"/>
+            <a:chOff x="3180947" y="1198355"/>
+            <a:chExt cx="5120640" cy="3108577"/>
           </a:xfrm>
         </p:grpSpPr>
         <p:sp>
           <p:nvSpPr>
-            <p:cNvPr id="4" name="TextBox 3">
+            <p:cNvPr id="7" name="Flowchart: Delay 6">
               <a:extLst>
                 <a:ext uri="{FF2B5EF4-FFF2-40B4-BE49-F238E27FC236}">
-                  <a16:creationId xmlns:a16="http://schemas.microsoft.com/office/drawing/2014/main" id="{AA1A3B13-3AA2-47EC-8F8E-54427342768F}"/>
+                  <a16:creationId xmlns:a16="http://schemas.microsoft.com/office/drawing/2014/main" id="{38AD9599-2EF4-4F1E-9DE6-3CB6C3B57660}"/>
                 </a:ext>
               </a:extLst>
             </p:cNvPr>
-            <p:cNvSpPr txBox="1"/>
+            <p:cNvSpPr/>
+            <p:nvPr/>
+          </p:nvSpPr>
+          <p:spPr>
+            <a:xfrm rot="16200000">
+              <a:off x="4657133" y="250318"/>
+              <a:ext cx="2126411" cy="4022486"/>
+            </a:xfrm>
+            <a:custGeom>
+              <a:avLst/>
+              <a:gdLst>
+                <a:gd name="connsiteX0" fmla="*/ 0 w 2893854"/>
+                <a:gd name="connsiteY0" fmla="*/ 0 h 4022485"/>
+                <a:gd name="connsiteX1" fmla="*/ 1446927 w 2893854"/>
+                <a:gd name="connsiteY1" fmla="*/ 0 h 4022485"/>
+                <a:gd name="connsiteX2" fmla="*/ 2893854 w 2893854"/>
+                <a:gd name="connsiteY2" fmla="*/ 2011243 h 4022485"/>
+                <a:gd name="connsiteX3" fmla="*/ 1446927 w 2893854"/>
+                <a:gd name="connsiteY3" fmla="*/ 4022486 h 4022485"/>
+                <a:gd name="connsiteX4" fmla="*/ 0 w 2893854"/>
+                <a:gd name="connsiteY4" fmla="*/ 4022485 h 4022485"/>
+                <a:gd name="connsiteX5" fmla="*/ 0 w 2893854"/>
+                <a:gd name="connsiteY5" fmla="*/ 0 h 4022485"/>
+                <a:gd name="connsiteX0" fmla="*/ 767443 w 2893854"/>
+                <a:gd name="connsiteY0" fmla="*/ 3 h 4022486"/>
+                <a:gd name="connsiteX1" fmla="*/ 1446927 w 2893854"/>
+                <a:gd name="connsiteY1" fmla="*/ 0 h 4022486"/>
+                <a:gd name="connsiteX2" fmla="*/ 2893854 w 2893854"/>
+                <a:gd name="connsiteY2" fmla="*/ 2011243 h 4022486"/>
+                <a:gd name="connsiteX3" fmla="*/ 1446927 w 2893854"/>
+                <a:gd name="connsiteY3" fmla="*/ 4022486 h 4022486"/>
+                <a:gd name="connsiteX4" fmla="*/ 0 w 2893854"/>
+                <a:gd name="connsiteY4" fmla="*/ 4022485 h 4022486"/>
+                <a:gd name="connsiteX5" fmla="*/ 767443 w 2893854"/>
+                <a:gd name="connsiteY5" fmla="*/ 3 h 4022486"/>
+                <a:gd name="connsiteX0" fmla="*/ 0 w 2126411"/>
+                <a:gd name="connsiteY0" fmla="*/ 3 h 4022486"/>
+                <a:gd name="connsiteX1" fmla="*/ 679484 w 2126411"/>
+                <a:gd name="connsiteY1" fmla="*/ 0 h 4022486"/>
+                <a:gd name="connsiteX2" fmla="*/ 2126411 w 2126411"/>
+                <a:gd name="connsiteY2" fmla="*/ 2011243 h 4022486"/>
+                <a:gd name="connsiteX3" fmla="*/ 679484 w 2126411"/>
+                <a:gd name="connsiteY3" fmla="*/ 4022486 h 4022486"/>
+                <a:gd name="connsiteX4" fmla="*/ 24493 w 2126411"/>
+                <a:gd name="connsiteY4" fmla="*/ 4022485 h 4022486"/>
+                <a:gd name="connsiteX5" fmla="*/ 0 w 2126411"/>
+                <a:gd name="connsiteY5" fmla="*/ 3 h 4022486"/>
+              </a:gdLst>
+              <a:ahLst/>
+              <a:cxnLst>
+                <a:cxn ang="0">
+                  <a:pos x="connsiteX0" y="connsiteY0"/>
+                </a:cxn>
+                <a:cxn ang="0">
+                  <a:pos x="connsiteX1" y="connsiteY1"/>
+                </a:cxn>
+                <a:cxn ang="0">
+                  <a:pos x="connsiteX2" y="connsiteY2"/>
+                </a:cxn>
+                <a:cxn ang="0">
+                  <a:pos x="connsiteX3" y="connsiteY3"/>
+                </a:cxn>
+                <a:cxn ang="0">
+                  <a:pos x="connsiteX4" y="connsiteY4"/>
+                </a:cxn>
+                <a:cxn ang="0">
+                  <a:pos x="connsiteX5" y="connsiteY5"/>
+                </a:cxn>
+              </a:cxnLst>
+              <a:rect l="l" t="t" r="r" b="b"/>
+              <a:pathLst>
+                <a:path w="2126411" h="4022486">
+                  <a:moveTo>
+                    <a:pt x="0" y="3"/>
+                  </a:moveTo>
+                  <a:lnTo>
+                    <a:pt x="679484" y="0"/>
+                  </a:lnTo>
+                  <a:cubicBezTo>
+                    <a:pt x="1478600" y="0"/>
+                    <a:pt x="2126411" y="900464"/>
+                    <a:pt x="2126411" y="2011243"/>
+                  </a:cubicBezTo>
+                  <a:cubicBezTo>
+                    <a:pt x="2126411" y="3122022"/>
+                    <a:pt x="1478600" y="4022486"/>
+                    <a:pt x="679484" y="4022486"/>
+                  </a:cubicBezTo>
+                  <a:lnTo>
+                    <a:pt x="24493" y="4022485"/>
+                  </a:lnTo>
+                  <a:lnTo>
+                    <a:pt x="0" y="3"/>
+                  </a:lnTo>
+                  <a:close/>
+                </a:path>
+              </a:pathLst>
+            </a:custGeom>
+            <a:solidFill>
+              <a:srgbClr val="B1FFE5"/>
+            </a:solidFill>
+            <a:ln>
+              <a:noFill/>
+            </a:ln>
+          </p:spPr>
+          <p:style>
+            <a:lnRef idx="2">
+              <a:schemeClr val="accent1">
+                <a:shade val="50000"/>
+              </a:schemeClr>
+            </a:lnRef>
+            <a:fillRef idx="1">
+              <a:schemeClr val="accent1"/>
+            </a:fillRef>
+            <a:effectRef idx="0">
+              <a:schemeClr val="accent1"/>
+            </a:effectRef>
+            <a:fontRef idx="minor">
+              <a:schemeClr val="lt1"/>
+            </a:fontRef>
+          </p:style>
+          <p:txBody>
+            <a:bodyPr rtlCol="0" anchor="ctr"/>
+            <a:lstStyle/>
+            <a:p>
+              <a:pPr algn="ctr"/>
+              <a:endParaRPr lang="en-GB"/>
+            </a:p>
+          </p:txBody>
+        </p:sp>
+        <p:sp>
+          <p:nvSpPr>
+            <p:cNvPr id="15" name="Rectangle 14">
+              <a:extLst>
+                <a:ext uri="{FF2B5EF4-FFF2-40B4-BE49-F238E27FC236}">
+                  <a16:creationId xmlns:a16="http://schemas.microsoft.com/office/drawing/2014/main" id="{7B8F2075-12F4-4780-A862-8F04FAF55711}"/>
+                </a:ext>
+              </a:extLst>
+            </p:cNvPr>
+            <p:cNvSpPr/>
             <p:nvPr/>
           </p:nvSpPr>
           <p:spPr>
             <a:xfrm>
-              <a:off x="2775005" y="2394754"/>
-              <a:ext cx="4161717" cy="923330"/>
+              <a:off x="3180947" y="3389172"/>
+              <a:ext cx="5120640" cy="917760"/>
             </a:xfrm>
             <a:prstGeom prst="rect">
               <a:avLst/>
             </a:prstGeom>
             <a:noFill/>
+            <a:ln>
+              <a:noFill/>
+            </a:ln>
           </p:spPr>
+          <p:style>
+            <a:lnRef idx="2">
+              <a:schemeClr val="accent1">
+                <a:shade val="50000"/>
+              </a:schemeClr>
+            </a:lnRef>
+            <a:fillRef idx="1">
+              <a:schemeClr val="accent1"/>
+            </a:fillRef>
+            <a:effectRef idx="0">
+              <a:schemeClr val="accent1"/>
+            </a:effectRef>
+            <a:fontRef idx="minor">
+              <a:schemeClr val="lt1"/>
+            </a:fontRef>
+          </p:style>
           <p:txBody>
-            <a:bodyPr wrap="none" rtlCol="0">
-              <a:spAutoFit/>
-            </a:bodyPr>
+            <a:bodyPr rtlCol="0" anchor="ctr"/>
             <a:lstStyle/>
             <a:p>
-              <a:r>
-                <a:rPr lang="en-US" sz="5400">
-                  <a:latin typeface="Rubik ExtraBold" pitchFamily="2" charset="-79"/>
-                  <a:cs typeface="Rubik ExtraBold" pitchFamily="2" charset="-79"/>
-                </a:rPr>
-                <a:t>WIDGETARI</a:t>
-              </a:r>
-              <a:endParaRPr lang="en-GB" sz="5400">
-                <a:latin typeface="Rubik ExtraBold" pitchFamily="2" charset="-79"/>
-                <a:cs typeface="Rubik ExtraBold" pitchFamily="2" charset="-79"/>
-              </a:endParaRPr>
+              <a:pPr algn="ctr"/>
+              <a:endParaRPr lang="en-GB"/>
             </a:p>
           </p:txBody>
         </p:sp>
         <p:pic>
           <p:nvPicPr>
-            <p:cNvPr id="8" name="Graphic 7">
+            <p:cNvPr id="6" name="Graphic 5">
               <a:extLst>
                 <a:ext uri="{FF2B5EF4-FFF2-40B4-BE49-F238E27FC236}">
-                  <a16:creationId xmlns:a16="http://schemas.microsoft.com/office/drawing/2014/main" id="{6000585C-5BA4-411D-B47D-94130FDD60F6}"/>
+                  <a16:creationId xmlns:a16="http://schemas.microsoft.com/office/drawing/2014/main" id="{55D0BCDE-41B6-4D1B-97AE-924297BA11A3}"/>
                 </a:ext>
               </a:extLst>
             </p:cNvPr>
@@ -3562,13 +3571,13 @@
             <p:nvPr/>
           </p:nvPicPr>
           <p:blipFill>
-            <a:blip r:embed="rId4">
+            <a:blip r:embed="rId2">
               <a:extLst>
                 <a:ext uri="{28A0092B-C50C-407E-A947-70E740481C1C}">
                   <a14:useLocalDpi xmlns:a14="http://schemas.microsoft.com/office/drawing/2010/main" val="0"/>
                 </a:ext>
                 <a:ext uri="{96DAC541-7B7A-43D3-8B79-37D633B846F1}">
-                  <asvg:svgBlip xmlns:asvg="http://schemas.microsoft.com/office/drawing/2016/SVG/main" r:embed="rId5"/>
+                  <asvg:svgBlip xmlns:asvg="http://schemas.microsoft.com/office/drawing/2016/SVG/main" r:embed="rId3"/>
                 </a:ext>
               </a:extLst>
             </a:blip>
@@ -3578,8 +3587,188 @@
           </p:blipFill>
           <p:spPr>
             <a:xfrm>
-              <a:off x="6842760" y="2503689"/>
-              <a:ext cx="683415" cy="705461"/>
+              <a:off x="4134498" y="2206813"/>
+              <a:ext cx="930125" cy="930125"/>
+            </a:xfrm>
+            <a:prstGeom prst="rect">
+              <a:avLst/>
+            </a:prstGeom>
+          </p:spPr>
+        </p:pic>
+        <p:grpSp>
+          <p:nvGrpSpPr>
+            <p:cNvPr id="13" name="Group 12">
+              <a:extLst>
+                <a:ext uri="{FF2B5EF4-FFF2-40B4-BE49-F238E27FC236}">
+                  <a16:creationId xmlns:a16="http://schemas.microsoft.com/office/drawing/2014/main" id="{A7251B03-2135-4A72-A548-64AE646195D2}"/>
+                </a:ext>
+              </a:extLst>
+            </p:cNvPr>
+            <p:cNvGrpSpPr/>
+            <p:nvPr/>
+          </p:nvGrpSpPr>
+          <p:grpSpPr>
+            <a:xfrm>
+              <a:off x="3346005" y="3193374"/>
+              <a:ext cx="4769417" cy="923330"/>
+              <a:chOff x="2773086" y="2204526"/>
+              <a:chExt cx="4769417" cy="923330"/>
+            </a:xfrm>
+          </p:grpSpPr>
+          <p:sp>
+            <p:nvSpPr>
+              <p:cNvPr id="4" name="TextBox 3">
+                <a:extLst>
+                  <a:ext uri="{FF2B5EF4-FFF2-40B4-BE49-F238E27FC236}">
+                    <a16:creationId xmlns:a16="http://schemas.microsoft.com/office/drawing/2014/main" id="{AA1A3B13-3AA2-47EC-8F8E-54427342768F}"/>
+                  </a:ext>
+                </a:extLst>
+              </p:cNvPr>
+              <p:cNvSpPr txBox="1"/>
+              <p:nvPr/>
+            </p:nvSpPr>
+            <p:spPr>
+              <a:xfrm>
+                <a:off x="2773086" y="2204526"/>
+                <a:ext cx="4161717" cy="923330"/>
+              </a:xfrm>
+              <a:prstGeom prst="rect">
+                <a:avLst/>
+              </a:prstGeom>
+              <a:noFill/>
+            </p:spPr>
+            <p:txBody>
+              <a:bodyPr wrap="none" rtlCol="0">
+                <a:spAutoFit/>
+              </a:bodyPr>
+              <a:lstStyle/>
+              <a:p>
+                <a:r>
+                  <a:rPr lang="en-US" sz="5400">
+                    <a:latin typeface="Rubik ExtraBold" pitchFamily="2" charset="-79"/>
+                    <a:cs typeface="Rubik ExtraBold" pitchFamily="2" charset="-79"/>
+                  </a:rPr>
+                  <a:t>WIDGETARI</a:t>
+                </a:r>
+                <a:endParaRPr lang="en-GB" sz="5400">
+                  <a:latin typeface="Rubik ExtraBold" pitchFamily="2" charset="-79"/>
+                  <a:cs typeface="Rubik ExtraBold" pitchFamily="2" charset="-79"/>
+                </a:endParaRPr>
+              </a:p>
+            </p:txBody>
+          </p:sp>
+          <p:pic>
+            <p:nvPicPr>
+              <p:cNvPr id="8" name="Graphic 7">
+                <a:extLst>
+                  <a:ext uri="{FF2B5EF4-FFF2-40B4-BE49-F238E27FC236}">
+                    <a16:creationId xmlns:a16="http://schemas.microsoft.com/office/drawing/2014/main" id="{6000585C-5BA4-411D-B47D-94130FDD60F6}"/>
+                  </a:ext>
+                </a:extLst>
+              </p:cNvPr>
+              <p:cNvPicPr>
+                <a:picLocks noChangeAspect="1"/>
+              </p:cNvPicPr>
+              <p:nvPr/>
+            </p:nvPicPr>
+            <p:blipFill>
+              <a:blip r:embed="rId4">
+                <a:extLst>
+                  <a:ext uri="{28A0092B-C50C-407E-A947-70E740481C1C}">
+                    <a14:useLocalDpi xmlns:a14="http://schemas.microsoft.com/office/drawing/2010/main" val="0"/>
+                  </a:ext>
+                  <a:ext uri="{96DAC541-7B7A-43D3-8B79-37D633B846F1}">
+                    <asvg:svgBlip xmlns:asvg="http://schemas.microsoft.com/office/drawing/2016/SVG/main" r:embed="rId5"/>
+                  </a:ext>
+                </a:extLst>
+              </a:blip>
+              <a:stretch>
+                <a:fillRect/>
+              </a:stretch>
+            </p:blipFill>
+            <p:spPr>
+              <a:xfrm>
+                <a:off x="6859088" y="2320622"/>
+                <a:ext cx="683415" cy="705461"/>
+              </a:xfrm>
+              <a:prstGeom prst="rect">
+                <a:avLst/>
+              </a:prstGeom>
+            </p:spPr>
+          </p:pic>
+        </p:grpSp>
+        <p:pic>
+          <p:nvPicPr>
+            <p:cNvPr id="10" name="Graphic 9">
+              <a:extLst>
+                <a:ext uri="{FF2B5EF4-FFF2-40B4-BE49-F238E27FC236}">
+                  <a16:creationId xmlns:a16="http://schemas.microsoft.com/office/drawing/2014/main" id="{4A40AF74-47BC-4747-AAC7-21E708335C91}"/>
+                </a:ext>
+              </a:extLst>
+            </p:cNvPr>
+            <p:cNvPicPr>
+              <a:picLocks noChangeAspect="1"/>
+            </p:cNvPicPr>
+            <p:nvPr/>
+          </p:nvPicPr>
+          <p:blipFill>
+            <a:blip r:embed="rId6">
+              <a:extLst>
+                <a:ext uri="{28A0092B-C50C-407E-A947-70E740481C1C}">
+                  <a14:useLocalDpi xmlns:a14="http://schemas.microsoft.com/office/drawing/2010/main" val="0"/>
+                </a:ext>
+                <a:ext uri="{96DAC541-7B7A-43D3-8B79-37D633B846F1}">
+                  <asvg:svgBlip xmlns:asvg="http://schemas.microsoft.com/office/drawing/2016/SVG/main" r:embed="rId7"/>
+                </a:ext>
+              </a:extLst>
+            </a:blip>
+            <a:stretch>
+              <a:fillRect/>
+            </a:stretch>
+          </p:blipFill>
+          <p:spPr>
+            <a:xfrm>
+              <a:off x="6162258" y="2123213"/>
+              <a:ext cx="1402615" cy="1122091"/>
+            </a:xfrm>
+            <a:prstGeom prst="rect">
+              <a:avLst/>
+            </a:prstGeom>
+          </p:spPr>
+        </p:pic>
+        <p:pic>
+          <p:nvPicPr>
+            <p:cNvPr id="12" name="Graphic 11">
+              <a:extLst>
+                <a:ext uri="{FF2B5EF4-FFF2-40B4-BE49-F238E27FC236}">
+                  <a16:creationId xmlns:a16="http://schemas.microsoft.com/office/drawing/2014/main" id="{265C8ABE-3508-4EFF-AD13-32585651F77C}"/>
+                </a:ext>
+              </a:extLst>
+            </p:cNvPr>
+            <p:cNvPicPr>
+              <a:picLocks noChangeAspect="1"/>
+            </p:cNvPicPr>
+            <p:nvPr/>
+          </p:nvPicPr>
+          <p:blipFill>
+            <a:blip r:embed="rId8">
+              <a:extLst>
+                <a:ext uri="{28A0092B-C50C-407E-A947-70E740481C1C}">
+                  <a14:useLocalDpi xmlns:a14="http://schemas.microsoft.com/office/drawing/2010/main" val="0"/>
+                </a:ext>
+                <a:ext uri="{96DAC541-7B7A-43D3-8B79-37D633B846F1}">
+                  <asvg:svgBlip xmlns:asvg="http://schemas.microsoft.com/office/drawing/2016/SVG/main" r:embed="rId9"/>
+                </a:ext>
+              </a:extLst>
+            </a:blip>
+            <a:stretch>
+              <a:fillRect/>
+            </a:stretch>
+          </p:blipFill>
+          <p:spPr>
+            <a:xfrm>
+              <a:off x="4977516" y="1378078"/>
+              <a:ext cx="1494845" cy="1195876"/>
             </a:xfrm>
             <a:prstGeom prst="rect">
               <a:avLst/>
@@ -3587,84 +3776,6 @@
           </p:spPr>
         </p:pic>
       </p:grpSp>
-      <p:pic>
-        <p:nvPicPr>
-          <p:cNvPr id="10" name="Graphic 9">
-            <a:extLst>
-              <a:ext uri="{FF2B5EF4-FFF2-40B4-BE49-F238E27FC236}">
-                <a16:creationId xmlns:a16="http://schemas.microsoft.com/office/drawing/2014/main" id="{4A40AF74-47BC-4747-AAC7-21E708335C91}"/>
-              </a:ext>
-            </a:extLst>
-          </p:cNvPr>
-          <p:cNvPicPr>
-            <a:picLocks noChangeAspect="1"/>
-          </p:cNvPicPr>
-          <p:nvPr/>
-        </p:nvPicPr>
-        <p:blipFill>
-          <a:blip r:embed="rId6">
-            <a:extLst>
-              <a:ext uri="{28A0092B-C50C-407E-A947-70E740481C1C}">
-                <a14:useLocalDpi xmlns:a14="http://schemas.microsoft.com/office/drawing/2010/main" val="0"/>
-              </a:ext>
-              <a:ext uri="{96DAC541-7B7A-43D3-8B79-37D633B846F1}">
-                <asvg:svgBlip xmlns:asvg="http://schemas.microsoft.com/office/drawing/2016/SVG/main" r:embed="rId7"/>
-              </a:ext>
-            </a:extLst>
-          </a:blip>
-          <a:stretch>
-            <a:fillRect/>
-          </a:stretch>
-        </p:blipFill>
-        <p:spPr>
-          <a:xfrm>
-            <a:off x="5868060" y="954372"/>
-            <a:ext cx="1402615" cy="1122091"/>
-          </a:xfrm>
-          <a:prstGeom prst="rect">
-            <a:avLst/>
-          </a:prstGeom>
-        </p:spPr>
-      </p:pic>
-      <p:pic>
-        <p:nvPicPr>
-          <p:cNvPr id="12" name="Graphic 11">
-            <a:extLst>
-              <a:ext uri="{FF2B5EF4-FFF2-40B4-BE49-F238E27FC236}">
-                <a16:creationId xmlns:a16="http://schemas.microsoft.com/office/drawing/2014/main" id="{265C8ABE-3508-4EFF-AD13-32585651F77C}"/>
-              </a:ext>
-            </a:extLst>
-          </p:cNvPr>
-          <p:cNvPicPr>
-            <a:picLocks noChangeAspect="1"/>
-          </p:cNvPicPr>
-          <p:nvPr/>
-        </p:nvPicPr>
-        <p:blipFill>
-          <a:blip r:embed="rId8">
-            <a:extLst>
-              <a:ext uri="{28A0092B-C50C-407E-A947-70E740481C1C}">
-                <a14:useLocalDpi xmlns:a14="http://schemas.microsoft.com/office/drawing/2010/main" val="0"/>
-              </a:ext>
-              <a:ext uri="{96DAC541-7B7A-43D3-8B79-37D633B846F1}">
-                <asvg:svgBlip xmlns:asvg="http://schemas.microsoft.com/office/drawing/2016/SVG/main" r:embed="rId9"/>
-              </a:ext>
-            </a:extLst>
-          </a:blip>
-          <a:stretch>
-            <a:fillRect/>
-          </a:stretch>
-        </p:blipFill>
-        <p:spPr>
-          <a:xfrm>
-            <a:off x="4683318" y="209237"/>
-            <a:ext cx="1494845" cy="1195876"/>
-          </a:xfrm>
-          <a:prstGeom prst="rect">
-            <a:avLst/>
-          </a:prstGeom>
-        </p:spPr>
-      </p:pic>
     </p:spTree>
     <p:extLst>
       <p:ext uri="{BB962C8B-B14F-4D97-AF65-F5344CB8AC3E}">

</xml_diff>